<commit_message>
update alis 5 examples
</commit_message>
<xml_diff>
--- a/prents_ch-alis.pptx
+++ b/prents_ch-alis.pptx
@@ -304,7 +304,7 @@
           <a:p>
             <a:fld id="{DAD4AEBD-E175-AE42-B084-2E4026DB8423}" type="datetimeFigureOut">
               <a:rPr lang="de-DE" smtClean="0"/>
-              <a:t>20.11.24</a:t>
+              <a:t>19.12.24</a:t>
             </a:fld>
             <a:endParaRPr lang="de-DE" dirty="0"/>
           </a:p>
@@ -472,7 +472,7 @@
           <a:p>
             <a:fld id="{DAD4AEBD-E175-AE42-B084-2E4026DB8423}" type="datetimeFigureOut">
               <a:rPr lang="de-DE" smtClean="0"/>
-              <a:t>20.11.24</a:t>
+              <a:t>19.12.24</a:t>
             </a:fld>
             <a:endParaRPr lang="de-DE" dirty="0"/>
           </a:p>
@@ -650,7 +650,7 @@
           <a:p>
             <a:fld id="{DAD4AEBD-E175-AE42-B084-2E4026DB8423}" type="datetimeFigureOut">
               <a:rPr lang="de-DE" smtClean="0"/>
-              <a:t>20.11.24</a:t>
+              <a:t>19.12.24</a:t>
             </a:fld>
             <a:endParaRPr lang="de-DE" dirty="0"/>
           </a:p>
@@ -818,7 +818,7 @@
           <a:p>
             <a:fld id="{DAD4AEBD-E175-AE42-B084-2E4026DB8423}" type="datetimeFigureOut">
               <a:rPr lang="de-DE" smtClean="0"/>
-              <a:t>20.11.24</a:t>
+              <a:t>19.12.24</a:t>
             </a:fld>
             <a:endParaRPr lang="de-DE" dirty="0"/>
           </a:p>
@@ -1063,7 +1063,7 @@
           <a:p>
             <a:fld id="{DAD4AEBD-E175-AE42-B084-2E4026DB8423}" type="datetimeFigureOut">
               <a:rPr lang="de-DE" smtClean="0"/>
-              <a:t>20.11.24</a:t>
+              <a:t>19.12.24</a:t>
             </a:fld>
             <a:endParaRPr lang="de-DE" dirty="0"/>
           </a:p>
@@ -1348,7 +1348,7 @@
           <a:p>
             <a:fld id="{DAD4AEBD-E175-AE42-B084-2E4026DB8423}" type="datetimeFigureOut">
               <a:rPr lang="de-DE" smtClean="0"/>
-              <a:t>20.11.24</a:t>
+              <a:t>19.12.24</a:t>
             </a:fld>
             <a:endParaRPr lang="de-DE" dirty="0"/>
           </a:p>
@@ -1767,7 +1767,7 @@
           <a:p>
             <a:fld id="{DAD4AEBD-E175-AE42-B084-2E4026DB8423}" type="datetimeFigureOut">
               <a:rPr lang="de-DE" smtClean="0"/>
-              <a:t>20.11.24</a:t>
+              <a:t>19.12.24</a:t>
             </a:fld>
             <a:endParaRPr lang="de-DE" dirty="0"/>
           </a:p>
@@ -1884,7 +1884,7 @@
           <a:p>
             <a:fld id="{DAD4AEBD-E175-AE42-B084-2E4026DB8423}" type="datetimeFigureOut">
               <a:rPr lang="de-DE" smtClean="0"/>
-              <a:t>20.11.24</a:t>
+              <a:t>19.12.24</a:t>
             </a:fld>
             <a:endParaRPr lang="de-DE" dirty="0"/>
           </a:p>
@@ -1979,7 +1979,7 @@
           <a:p>
             <a:fld id="{DAD4AEBD-E175-AE42-B084-2E4026DB8423}" type="datetimeFigureOut">
               <a:rPr lang="de-DE" smtClean="0"/>
-              <a:t>20.11.24</a:t>
+              <a:t>19.12.24</a:t>
             </a:fld>
             <a:endParaRPr lang="de-DE" dirty="0"/>
           </a:p>
@@ -2254,7 +2254,7 @@
           <a:p>
             <a:fld id="{DAD4AEBD-E175-AE42-B084-2E4026DB8423}" type="datetimeFigureOut">
               <a:rPr lang="de-DE" smtClean="0"/>
-              <a:t>20.11.24</a:t>
+              <a:t>19.12.24</a:t>
             </a:fld>
             <a:endParaRPr lang="de-DE" dirty="0"/>
           </a:p>
@@ -2506,7 +2506,7 @@
           <a:p>
             <a:fld id="{DAD4AEBD-E175-AE42-B084-2E4026DB8423}" type="datetimeFigureOut">
               <a:rPr lang="de-DE" smtClean="0"/>
-              <a:t>20.11.24</a:t>
+              <a:t>19.12.24</a:t>
             </a:fld>
             <a:endParaRPr lang="de-DE" dirty="0"/>
           </a:p>
@@ -2717,7 +2717,7 @@
           <a:p>
             <a:fld id="{DAD4AEBD-E175-AE42-B084-2E4026DB8423}" type="datetimeFigureOut">
               <a:rPr lang="de-DE" smtClean="0"/>
-              <a:t>20.11.24</a:t>
+              <a:t>19.12.24</a:t>
             </a:fld>
             <a:endParaRPr lang="de-DE" dirty="0"/>
           </a:p>
@@ -7215,23 +7215,8 @@
                 </a:solidFill>
                 <a:latin typeface="Times New Roman" pitchFamily="-107" charset="0"/>
               </a:rPr>
-              <a:t>Fields like ServiceDate, </a:t>
-            </a:r>
-            <a:r>
-              <a:rPr lang="de-DE" sz="1400" i="1" dirty="0" err="1">
-                <a:solidFill>
-                  <a:srgbClr val="000000"/>
-                </a:solidFill>
-                <a:latin typeface="Times New Roman" pitchFamily="-107" charset="0"/>
-              </a:rPr>
-              <a:t>ServiceItem</a:t>
-            </a:r>
-            <a:endParaRPr lang="de-DE" sz="1400" i="1" dirty="0">
-              <a:solidFill>
-                <a:srgbClr val="000000"/>
-              </a:solidFill>
-              <a:latin typeface="Times New Roman" pitchFamily="-107" charset="0"/>
-            </a:endParaRPr>
+              <a:t>Fields like ServiceDate, ServiceItem</a:t>
+            </a:r>
           </a:p>
           <a:p>
             <a:pPr marL="285750" indent="-285750">
@@ -7246,25 +7231,7 @@
                 </a:solidFill>
                 <a:latin typeface="Times New Roman" pitchFamily="-107" charset="0"/>
               </a:rPr>
-              <a:t>New: </a:t>
-            </a:r>
-            <a:r>
-              <a:rPr lang="de-DE" sz="1400" i="1" dirty="0" err="1">
-                <a:solidFill>
-                  <a:srgbClr val="000000"/>
-                </a:solidFill>
-                <a:latin typeface="Times New Roman" pitchFamily="-107" charset="0"/>
-              </a:rPr>
-              <a:t>PatientContactID</a:t>
-            </a:r>
-            <a:r>
-              <a:rPr lang="de-DE" sz="1400" i="1" dirty="0">
-                <a:solidFill>
-                  <a:srgbClr val="000000"/>
-                </a:solidFill>
-                <a:latin typeface="Times New Roman" pitchFamily="-107" charset="0"/>
-              </a:rPr>
-              <a:t>, </a:t>
+              <a:t>New: PatientContactID, </a:t>
             </a:r>
             <a:r>
               <a:rPr lang="de-DE" sz="1400" i="1" dirty="0" err="1">
@@ -10066,23 +10033,8 @@
                 </a:solidFill>
                 <a:latin typeface="Times New Roman" pitchFamily="-107" charset="0"/>
               </a:rPr>
-              <a:t>Fields like DiagCode, </a:t>
-            </a:r>
-            <a:r>
-              <a:rPr lang="de-DE" sz="1400" i="1" dirty="0" err="1">
-                <a:solidFill>
-                  <a:srgbClr val="000000"/>
-                </a:solidFill>
-                <a:latin typeface="Times New Roman" pitchFamily="-107" charset="0"/>
-              </a:rPr>
-              <a:t>DiagType</a:t>
-            </a:r>
-            <a:endParaRPr lang="de-DE" sz="1400" i="1" dirty="0">
-              <a:solidFill>
-                <a:srgbClr val="000000"/>
-              </a:solidFill>
-              <a:latin typeface="Times New Roman" pitchFamily="-107" charset="0"/>
-            </a:endParaRPr>
+              <a:t>Fields like DiagCode, DiagType</a:t>
+            </a:r>
           </a:p>
           <a:p>
             <a:pPr marL="285750" indent="-285750">
@@ -10097,41 +10049,8 @@
                 </a:solidFill>
                 <a:latin typeface="Times New Roman" pitchFamily="-107" charset="0"/>
               </a:rPr>
-              <a:t>New Fields: </a:t>
-            </a:r>
-            <a:r>
-              <a:rPr lang="de-DE" sz="1400" i="1" dirty="0" err="1">
-                <a:solidFill>
-                  <a:srgbClr val="000000"/>
-                </a:solidFill>
-                <a:latin typeface="Times New Roman" pitchFamily="-107" charset="0"/>
-              </a:rPr>
-              <a:t>OnsetDateTime</a:t>
-            </a:r>
-            <a:r>
-              <a:rPr lang="de-DE" sz="1400" i="1" dirty="0">
-                <a:solidFill>
-                  <a:srgbClr val="000000"/>
-                </a:solidFill>
-                <a:latin typeface="Times New Roman" pitchFamily="-107" charset="0"/>
-              </a:rPr>
-              <a:t>, </a:t>
-            </a:r>
-            <a:r>
-              <a:rPr lang="de-DE" sz="1400" i="1" dirty="0" err="1">
-                <a:solidFill>
-                  <a:srgbClr val="000000"/>
-                </a:solidFill>
-                <a:latin typeface="Times New Roman" pitchFamily="-107" charset="0"/>
-              </a:rPr>
-              <a:t>Laterality</a:t>
-            </a:r>
-            <a:endParaRPr lang="de-DE" sz="1400" i="1" dirty="0">
-              <a:solidFill>
-                <a:srgbClr val="000000"/>
-              </a:solidFill>
-              <a:latin typeface="Times New Roman" pitchFamily="-107" charset="0"/>
-            </a:endParaRPr>
+              <a:t>New Fields: OnsetDateTime, Laterality</a:t>
+            </a:r>
           </a:p>
         </p:txBody>
       </p:sp>
@@ -10255,23 +10174,8 @@
                 </a:solidFill>
                 <a:latin typeface="Times New Roman" pitchFamily="-107" charset="0"/>
               </a:rPr>
-              <a:t>Fields like ServiceDate, </a:t>
-            </a:r>
-            <a:r>
-              <a:rPr lang="de-DE" sz="1400" i="1" dirty="0" err="1">
-                <a:solidFill>
-                  <a:srgbClr val="000000"/>
-                </a:solidFill>
-                <a:latin typeface="Times New Roman" pitchFamily="-107" charset="0"/>
-              </a:rPr>
-              <a:t>ServiceItem</a:t>
-            </a:r>
-            <a:endParaRPr lang="de-DE" sz="1400" i="1" dirty="0">
-              <a:solidFill>
-                <a:srgbClr val="000000"/>
-              </a:solidFill>
-              <a:latin typeface="Times New Roman" pitchFamily="-107" charset="0"/>
-            </a:endParaRPr>
+              <a:t>Fields like ServiceDate, ServiceItem</a:t>
+            </a:r>
           </a:p>
           <a:p>
             <a:pPr marL="285750" indent="-285750">
@@ -10286,23 +10190,8 @@
                 </a:solidFill>
                 <a:latin typeface="Times New Roman" pitchFamily="-107" charset="0"/>
               </a:rPr>
-              <a:t>New: </a:t>
-            </a:r>
-            <a:r>
-              <a:rPr lang="de-DE" sz="1400" i="1" dirty="0" err="1">
-                <a:solidFill>
-                  <a:srgbClr val="000000"/>
-                </a:solidFill>
-                <a:latin typeface="Times New Roman" pitchFamily="-107" charset="0"/>
-              </a:rPr>
-              <a:t>TPValue</a:t>
-            </a:r>
-            <a:endParaRPr lang="de-DE" sz="1400" i="1" dirty="0">
-              <a:solidFill>
-                <a:srgbClr val="000000"/>
-              </a:solidFill>
-              <a:latin typeface="Times New Roman" pitchFamily="-107" charset="0"/>
-            </a:endParaRPr>
+              <a:t>New: TPValue</a:t>
+            </a:r>
           </a:p>
         </p:txBody>
       </p:sp>
@@ -10637,7 +10526,7 @@
               <a:t>New: </a:t>
             </a:r>
             <a:r>
-              <a:rPr lang="de-DE" sz="1400" i="1" dirty="0" err="1">
+              <a:rPr lang="de-DE" sz="1400" i="1" dirty="0">
                 <a:solidFill>
                   <a:srgbClr val="000000"/>
                 </a:solidFill>
@@ -10664,6 +10553,1644 @@
               </a:solidFill>
               <a:latin typeface="Times New Roman" pitchFamily="-107" charset="0"/>
             </a:endParaRPr>
+          </a:p>
+        </p:txBody>
+      </p:sp>
+      <p:sp>
+        <p:nvSpPr>
+          <p:cNvPr id="4" name="AutoShape 29">
+            <a:extLst>
+              <a:ext uri="{FF2B5EF4-FFF2-40B4-BE49-F238E27FC236}">
+                <a16:creationId xmlns:a16="http://schemas.microsoft.com/office/drawing/2014/main" id="{9C98CA3E-016F-0840-33B3-A9A3C6B3EAAC}"/>
+              </a:ext>
+            </a:extLst>
+          </p:cNvPr>
+          <p:cNvSpPr>
+            <a:spLocks noChangeArrowheads="1"/>
+          </p:cNvSpPr>
+          <p:nvPr/>
+        </p:nvSpPr>
+        <p:spPr bwMode="auto">
+          <a:xfrm flipV="1">
+            <a:off x="5784126" y="2925099"/>
+            <a:ext cx="4999899" cy="7826473"/>
+          </a:xfrm>
+          <a:prstGeom prst="foldedCorner">
+            <a:avLst>
+              <a:gd name="adj" fmla="val 5618"/>
+            </a:avLst>
+          </a:prstGeom>
+          <a:ln>
+            <a:headEnd/>
+            <a:tailEnd/>
+          </a:ln>
+        </p:spPr>
+        <p:style>
+          <a:lnRef idx="0">
+            <a:schemeClr val="accent6"/>
+          </a:lnRef>
+          <a:fillRef idx="3">
+            <a:schemeClr val="accent6"/>
+          </a:fillRef>
+          <a:effectRef idx="3">
+            <a:schemeClr val="accent6"/>
+          </a:effectRef>
+          <a:fontRef idx="minor">
+            <a:schemeClr val="lt1"/>
+          </a:fontRef>
+        </p:style>
+        <p:txBody>
+          <a:bodyPr wrap="none" anchor="ctr"/>
+          <a:lstStyle/>
+          <a:p>
+            <a:pPr>
+              <a:defRPr/>
+            </a:pPr>
+            <a:endParaRPr lang="de-DE" dirty="0"/>
+          </a:p>
+          <a:p>
+            <a:pPr>
+              <a:defRPr/>
+            </a:pPr>
+            <a:endParaRPr lang="de-DE" dirty="0"/>
+          </a:p>
+          <a:p>
+            <a:pPr>
+              <a:defRPr/>
+            </a:pPr>
+            <a:endParaRPr lang="de-DE" dirty="0"/>
+          </a:p>
+          <a:p>
+            <a:pPr>
+              <a:defRPr/>
+            </a:pPr>
+            <a:endParaRPr lang="de-DE" dirty="0"/>
+          </a:p>
+          <a:p>
+            <a:pPr>
+              <a:defRPr/>
+            </a:pPr>
+            <a:endParaRPr lang="de-DE" dirty="0"/>
+          </a:p>
+          <a:p>
+            <a:pPr>
+              <a:defRPr/>
+            </a:pPr>
+            <a:endParaRPr lang="de-DE" dirty="0"/>
+          </a:p>
+          <a:p>
+            <a:pPr>
+              <a:defRPr/>
+            </a:pPr>
+            <a:endParaRPr lang="de-DE" dirty="0"/>
+          </a:p>
+          <a:p>
+            <a:pPr>
+              <a:defRPr/>
+            </a:pPr>
+            <a:endParaRPr lang="de-DE" dirty="0"/>
+          </a:p>
+          <a:p>
+            <a:pPr>
+              <a:defRPr/>
+            </a:pPr>
+            <a:endParaRPr lang="de-DE" dirty="0"/>
+          </a:p>
+          <a:p>
+            <a:pPr>
+              <a:defRPr/>
+            </a:pPr>
+            <a:endParaRPr lang="de-DE" dirty="0"/>
+          </a:p>
+          <a:p>
+            <a:pPr>
+              <a:defRPr/>
+            </a:pPr>
+            <a:endParaRPr lang="de-DE" dirty="0"/>
+          </a:p>
+          <a:p>
+            <a:pPr>
+              <a:defRPr/>
+            </a:pPr>
+            <a:endParaRPr lang="de-DE" dirty="0"/>
+          </a:p>
+          <a:p>
+            <a:pPr>
+              <a:defRPr/>
+            </a:pPr>
+            <a:endParaRPr lang="de-DE" dirty="0"/>
+          </a:p>
+          <a:p>
+            <a:pPr>
+              <a:defRPr/>
+            </a:pPr>
+            <a:endParaRPr lang="de-DE" dirty="0"/>
+          </a:p>
+          <a:p>
+            <a:pPr>
+              <a:defRPr/>
+            </a:pPr>
+            <a:endParaRPr lang="de-DE" dirty="0"/>
+          </a:p>
+          <a:p>
+            <a:pPr>
+              <a:defRPr/>
+            </a:pPr>
+            <a:endParaRPr lang="de-DE" dirty="0"/>
+          </a:p>
+          <a:p>
+            <a:pPr>
+              <a:defRPr/>
+            </a:pPr>
+            <a:endParaRPr lang="de-DE" dirty="0"/>
+          </a:p>
+          <a:p>
+            <a:pPr>
+              <a:defRPr/>
+            </a:pPr>
+            <a:endParaRPr lang="de-DE" dirty="0"/>
+          </a:p>
+          <a:p>
+            <a:pPr>
+              <a:defRPr/>
+            </a:pPr>
+            <a:endParaRPr lang="de-DE" dirty="0"/>
+          </a:p>
+          <a:p>
+            <a:pPr>
+              <a:defRPr/>
+            </a:pPr>
+            <a:endParaRPr lang="de-DE" dirty="0"/>
+          </a:p>
+          <a:p>
+            <a:pPr>
+              <a:defRPr/>
+            </a:pPr>
+            <a:endParaRPr lang="de-DE" dirty="0"/>
+          </a:p>
+          <a:p>
+            <a:pPr>
+              <a:defRPr/>
+            </a:pPr>
+            <a:endParaRPr lang="de-DE" dirty="0"/>
+          </a:p>
+          <a:p>
+            <a:pPr>
+              <a:defRPr/>
+            </a:pPr>
+            <a:endParaRPr lang="de-DE" dirty="0"/>
+          </a:p>
+          <a:p>
+            <a:pPr>
+              <a:defRPr/>
+            </a:pPr>
+            <a:endParaRPr lang="de-DE" dirty="0"/>
+          </a:p>
+        </p:txBody>
+      </p:sp>
+      <p:sp>
+        <p:nvSpPr>
+          <p:cNvPr id="5" name="Rectangle 5">
+            <a:extLst>
+              <a:ext uri="{FF2B5EF4-FFF2-40B4-BE49-F238E27FC236}">
+                <a16:creationId xmlns:a16="http://schemas.microsoft.com/office/drawing/2014/main" id="{AA1CC53E-EA77-5636-250B-6B83D5E78CFB}"/>
+              </a:ext>
+            </a:extLst>
+          </p:cNvPr>
+          <p:cNvSpPr>
+            <a:spLocks noChangeArrowheads="1"/>
+          </p:cNvSpPr>
+          <p:nvPr/>
+        </p:nvSpPr>
+        <p:spPr bwMode="auto">
+          <a:xfrm>
+            <a:off x="5985067" y="3807142"/>
+            <a:ext cx="4520161" cy="1254970"/>
+          </a:xfrm>
+          <a:prstGeom prst="rect">
+            <a:avLst/>
+          </a:prstGeom>
+          <a:ln>
+            <a:headEnd/>
+            <a:tailEnd/>
+          </a:ln>
+        </p:spPr>
+        <p:style>
+          <a:lnRef idx="0">
+            <a:schemeClr val="accent6"/>
+          </a:lnRef>
+          <a:fillRef idx="3">
+            <a:schemeClr val="accent6"/>
+          </a:fillRef>
+          <a:effectRef idx="3">
+            <a:schemeClr val="accent6"/>
+          </a:effectRef>
+          <a:fontRef idx="minor">
+            <a:schemeClr val="lt1"/>
+          </a:fontRef>
+        </p:style>
+        <p:txBody>
+          <a:bodyPr wrap="none" tIns="46800" anchor="t" anchorCtr="0">
+            <a:noAutofit/>
+          </a:bodyPr>
+          <a:lstStyle/>
+          <a:p>
+            <a:pPr>
+              <a:defRPr/>
+            </a:pPr>
+            <a:r>
+              <a:rPr lang="de-DE" b="1" dirty="0">
+                <a:solidFill>
+                  <a:srgbClr val="000000"/>
+                </a:solidFill>
+              </a:rPr>
+              <a:t>Entry: MessageHeader </a:t>
+            </a:r>
+            <a:r>
+              <a:rPr lang="de-DE" dirty="0">
+                <a:solidFill>
+                  <a:srgbClr val="000000"/>
+                </a:solidFill>
+              </a:rPr>
+              <a:t>(1..1)</a:t>
+            </a:r>
+            <a:endParaRPr lang="de-DE" b="1" i="1" dirty="0">
+              <a:solidFill>
+                <a:srgbClr val="000000"/>
+              </a:solidFill>
+            </a:endParaRPr>
+          </a:p>
+          <a:p>
+            <a:pPr>
+              <a:lnSpc>
+                <a:spcPct val="150000"/>
+              </a:lnSpc>
+              <a:defRPr/>
+            </a:pPr>
+            <a:endParaRPr lang="de-DE" b="1" i="1" dirty="0">
+              <a:solidFill>
+                <a:srgbClr val="000000"/>
+              </a:solidFill>
+            </a:endParaRPr>
+          </a:p>
+          <a:p>
+            <a:pPr>
+              <a:defRPr/>
+            </a:pPr>
+            <a:endParaRPr lang="de-DE" b="1" i="1" dirty="0">
+              <a:solidFill>
+                <a:srgbClr val="000000"/>
+              </a:solidFill>
+            </a:endParaRPr>
+          </a:p>
+          <a:p>
+            <a:pPr>
+              <a:defRPr/>
+            </a:pPr>
+            <a:endParaRPr lang="de-DE" b="1" i="1" dirty="0">
+              <a:solidFill>
+                <a:srgbClr val="000000"/>
+              </a:solidFill>
+            </a:endParaRPr>
+          </a:p>
+          <a:p>
+            <a:pPr>
+              <a:defRPr/>
+            </a:pPr>
+            <a:r>
+              <a:rPr lang="de-DE" b="1" i="1" dirty="0">
+                <a:solidFill>
+                  <a:srgbClr val="000000"/>
+                </a:solidFill>
+              </a:rPr>
+              <a:t> </a:t>
+            </a:r>
+          </a:p>
+          <a:p>
+            <a:pPr>
+              <a:defRPr/>
+            </a:pPr>
+            <a:endParaRPr lang="de-DE" sz="1600" b="1" i="1" dirty="0">
+              <a:solidFill>
+                <a:srgbClr val="000000"/>
+              </a:solidFill>
+              <a:latin typeface="Times New Roman" pitchFamily="-107" charset="0"/>
+            </a:endParaRPr>
+          </a:p>
+          <a:p>
+            <a:pPr>
+              <a:defRPr/>
+            </a:pPr>
+            <a:endParaRPr lang="de-DE" sz="1600" b="1" i="1" dirty="0">
+              <a:solidFill>
+                <a:srgbClr val="000000"/>
+              </a:solidFill>
+              <a:latin typeface="Times New Roman" pitchFamily="-107" charset="0"/>
+            </a:endParaRPr>
+          </a:p>
+          <a:p>
+            <a:pPr>
+              <a:defRPr/>
+            </a:pPr>
+            <a:endParaRPr lang="de-DE" sz="1600" i="1" dirty="0">
+              <a:latin typeface="Times New Roman" pitchFamily="-107" charset="0"/>
+            </a:endParaRPr>
+          </a:p>
+        </p:txBody>
+      </p:sp>
+      <p:sp>
+        <p:nvSpPr>
+          <p:cNvPr id="6" name="Text Box 10">
+            <a:extLst>
+              <a:ext uri="{FF2B5EF4-FFF2-40B4-BE49-F238E27FC236}">
+                <a16:creationId xmlns:a16="http://schemas.microsoft.com/office/drawing/2014/main" id="{AC8F3699-493B-3CD0-AD2C-AE0639FD540C}"/>
+              </a:ext>
+            </a:extLst>
+          </p:cNvPr>
+          <p:cNvSpPr txBox="1">
+            <a:spLocks noChangeArrowheads="1"/>
+          </p:cNvSpPr>
+          <p:nvPr/>
+        </p:nvSpPr>
+        <p:spPr bwMode="auto">
+          <a:xfrm>
+            <a:off x="6156361" y="4538661"/>
+            <a:ext cx="3915661" cy="338554"/>
+          </a:xfrm>
+          <a:prstGeom prst="rect">
+            <a:avLst/>
+          </a:prstGeom>
+          <a:ln>
+            <a:headEnd/>
+            <a:tailEnd/>
+          </a:ln>
+        </p:spPr>
+        <p:style>
+          <a:lnRef idx="0">
+            <a:schemeClr val="accent6"/>
+          </a:lnRef>
+          <a:fillRef idx="3">
+            <a:schemeClr val="accent6"/>
+          </a:fillRef>
+          <a:effectRef idx="3">
+            <a:schemeClr val="accent6"/>
+          </a:effectRef>
+          <a:fontRef idx="minor">
+            <a:schemeClr val="lt1"/>
+          </a:fontRef>
+        </p:style>
+        <p:txBody>
+          <a:bodyPr wrap="square">
+            <a:spAutoFit/>
+          </a:bodyPr>
+          <a:lstStyle/>
+          <a:p>
+            <a:pPr>
+              <a:spcBef>
+                <a:spcPts val="300"/>
+              </a:spcBef>
+              <a:spcAft>
+                <a:spcPts val="300"/>
+              </a:spcAft>
+              <a:defRPr/>
+            </a:pPr>
+            <a:r>
+              <a:rPr lang="fr-FR" sz="1600" b="1" noProof="1">
+                <a:solidFill>
+                  <a:schemeClr val="tx1"/>
+                </a:solidFill>
+              </a:rPr>
+              <a:t>Bundle Transaction</a:t>
+            </a:r>
+            <a:r>
+              <a:rPr lang="fr-FR" sz="1600" noProof="1">
+                <a:solidFill>
+                  <a:schemeClr val="tx1"/>
+                </a:solidFill>
+              </a:rPr>
+              <a:t> (Reference 1..1)</a:t>
+            </a:r>
+          </a:p>
+        </p:txBody>
+      </p:sp>
+      <p:sp>
+        <p:nvSpPr>
+          <p:cNvPr id="7" name="Rechteck 8">
+            <a:extLst>
+              <a:ext uri="{FF2B5EF4-FFF2-40B4-BE49-F238E27FC236}">
+                <a16:creationId xmlns:a16="http://schemas.microsoft.com/office/drawing/2014/main" id="{5EA5D9E6-55B3-1769-6FE7-508BC7122CBF}"/>
+              </a:ext>
+            </a:extLst>
+          </p:cNvPr>
+          <p:cNvSpPr/>
+          <p:nvPr/>
+        </p:nvSpPr>
+        <p:spPr>
+          <a:xfrm>
+            <a:off x="5962118" y="3067336"/>
+            <a:ext cx="4603503" cy="369332"/>
+          </a:xfrm>
+          <a:prstGeom prst="rect">
+            <a:avLst/>
+          </a:prstGeom>
+        </p:spPr>
+        <p:txBody>
+          <a:bodyPr wrap="square">
+            <a:spAutoFit/>
+          </a:bodyPr>
+          <a:lstStyle/>
+          <a:p>
+            <a:r>
+              <a:rPr lang="de-DE" b="1" dirty="0">
+                <a:solidFill>
+                  <a:srgbClr val="000000"/>
+                </a:solidFill>
+              </a:rPr>
+              <a:t>Bundle: Message</a:t>
+            </a:r>
+            <a:endParaRPr lang="de-DE" dirty="0"/>
+          </a:p>
+        </p:txBody>
+      </p:sp>
+      <p:sp>
+        <p:nvSpPr>
+          <p:cNvPr id="8" name="Textfeld 16">
+            <a:extLst>
+              <a:ext uri="{FF2B5EF4-FFF2-40B4-BE49-F238E27FC236}">
+                <a16:creationId xmlns:a16="http://schemas.microsoft.com/office/drawing/2014/main" id="{2C3A5F10-A732-3F39-6BFF-923A3C336256}"/>
+              </a:ext>
+            </a:extLst>
+          </p:cNvPr>
+          <p:cNvSpPr txBox="1"/>
+          <p:nvPr/>
+        </p:nvSpPr>
+        <p:spPr>
+          <a:xfrm>
+            <a:off x="6104727" y="4177742"/>
+            <a:ext cx="3318851" cy="523220"/>
+          </a:xfrm>
+          <a:prstGeom prst="rect">
+            <a:avLst/>
+          </a:prstGeom>
+          <a:noFill/>
+        </p:spPr>
+        <p:txBody>
+          <a:bodyPr wrap="square" rtlCol="0">
+            <a:spAutoFit/>
+          </a:bodyPr>
+          <a:lstStyle/>
+          <a:p>
+            <a:pPr marL="285750" indent="-285750">
+              <a:buFont typeface="Arial"/>
+              <a:buChar char="•"/>
+              <a:defRPr/>
+            </a:pPr>
+            <a:r>
+              <a:rPr lang="de-DE" sz="1400" i="1" dirty="0">
+                <a:solidFill>
+                  <a:srgbClr val="000000"/>
+                </a:solidFill>
+                <a:latin typeface="Times New Roman" pitchFamily="-107" charset="0"/>
+              </a:rPr>
+              <a:t>Parameters like destination, source</a:t>
+            </a:r>
+          </a:p>
+          <a:p>
+            <a:pPr marL="285750" indent="-285750">
+              <a:buFont typeface="Arial"/>
+              <a:buChar char="•"/>
+              <a:defRPr/>
+            </a:pPr>
+            <a:endParaRPr lang="de-DE" sz="1400" i="1" dirty="0">
+              <a:solidFill>
+                <a:srgbClr val="000000"/>
+              </a:solidFill>
+              <a:latin typeface="Times New Roman" pitchFamily="-107" charset="0"/>
+            </a:endParaRPr>
+          </a:p>
+        </p:txBody>
+      </p:sp>
+      <p:sp>
+        <p:nvSpPr>
+          <p:cNvPr id="9" name="Text Box 10">
+            <a:extLst>
+              <a:ext uri="{FF2B5EF4-FFF2-40B4-BE49-F238E27FC236}">
+                <a16:creationId xmlns:a16="http://schemas.microsoft.com/office/drawing/2014/main" id="{B3F1A3C2-D7FD-396A-08A9-852F772DCF31}"/>
+              </a:ext>
+            </a:extLst>
+          </p:cNvPr>
+          <p:cNvSpPr txBox="1">
+            <a:spLocks noChangeArrowheads="1"/>
+          </p:cNvSpPr>
+          <p:nvPr/>
+        </p:nvSpPr>
+        <p:spPr bwMode="auto">
+          <a:xfrm>
+            <a:off x="5985068" y="5191486"/>
+            <a:ext cx="4500000" cy="5364000"/>
+          </a:xfrm>
+          <a:prstGeom prst="rect">
+            <a:avLst/>
+          </a:prstGeom>
+          <a:ln>
+            <a:headEnd/>
+            <a:tailEnd/>
+          </a:ln>
+        </p:spPr>
+        <p:style>
+          <a:lnRef idx="0">
+            <a:schemeClr val="accent6"/>
+          </a:lnRef>
+          <a:fillRef idx="3">
+            <a:schemeClr val="accent6"/>
+          </a:fillRef>
+          <a:effectRef idx="3">
+            <a:schemeClr val="accent6"/>
+          </a:effectRef>
+          <a:fontRef idx="minor">
+            <a:schemeClr val="lt1"/>
+          </a:fontRef>
+        </p:style>
+        <p:txBody>
+          <a:bodyPr wrap="square">
+            <a:spAutoFit/>
+          </a:bodyPr>
+          <a:lstStyle/>
+          <a:p>
+            <a:pPr>
+              <a:spcBef>
+                <a:spcPts val="300"/>
+              </a:spcBef>
+              <a:spcAft>
+                <a:spcPts val="300"/>
+              </a:spcAft>
+              <a:defRPr/>
+            </a:pPr>
+            <a:r>
+              <a:rPr lang="fr-FR" sz="1600" b="1" noProof="1">
+                <a:solidFill>
+                  <a:schemeClr val="tx1"/>
+                </a:solidFill>
+              </a:rPr>
+              <a:t>Entry: Bundle Transaction </a:t>
+            </a:r>
+            <a:r>
+              <a:rPr lang="fr-FR" sz="1600" noProof="1">
+                <a:solidFill>
+                  <a:schemeClr val="tx1"/>
+                </a:solidFill>
+              </a:rPr>
+              <a:t>(1..1)</a:t>
+            </a:r>
+          </a:p>
+          <a:p>
+            <a:pPr>
+              <a:spcBef>
+                <a:spcPts val="300"/>
+              </a:spcBef>
+              <a:spcAft>
+                <a:spcPts val="300"/>
+              </a:spcAft>
+              <a:defRPr/>
+            </a:pPr>
+            <a:endParaRPr lang="fr-FR" sz="1600" noProof="1">
+              <a:solidFill>
+                <a:schemeClr val="tx1"/>
+              </a:solidFill>
+            </a:endParaRPr>
+          </a:p>
+          <a:p>
+            <a:pPr>
+              <a:spcBef>
+                <a:spcPts val="300"/>
+              </a:spcBef>
+              <a:spcAft>
+                <a:spcPts val="300"/>
+              </a:spcAft>
+              <a:defRPr/>
+            </a:pPr>
+            <a:endParaRPr lang="fr-FR" sz="1600" noProof="1">
+              <a:solidFill>
+                <a:schemeClr val="tx1"/>
+              </a:solidFill>
+            </a:endParaRPr>
+          </a:p>
+          <a:p>
+            <a:pPr>
+              <a:spcBef>
+                <a:spcPts val="300"/>
+              </a:spcBef>
+              <a:spcAft>
+                <a:spcPts val="300"/>
+              </a:spcAft>
+              <a:defRPr/>
+            </a:pPr>
+            <a:endParaRPr lang="fr-FR" sz="1600" noProof="1">
+              <a:solidFill>
+                <a:schemeClr val="tx1"/>
+              </a:solidFill>
+            </a:endParaRPr>
+          </a:p>
+          <a:p>
+            <a:pPr>
+              <a:spcBef>
+                <a:spcPts val="300"/>
+              </a:spcBef>
+              <a:spcAft>
+                <a:spcPts val="300"/>
+              </a:spcAft>
+              <a:defRPr/>
+            </a:pPr>
+            <a:endParaRPr lang="fr-FR" sz="1600" noProof="1">
+              <a:solidFill>
+                <a:schemeClr val="tx1"/>
+              </a:solidFill>
+            </a:endParaRPr>
+          </a:p>
+          <a:p>
+            <a:pPr>
+              <a:spcBef>
+                <a:spcPts val="300"/>
+              </a:spcBef>
+              <a:spcAft>
+                <a:spcPts val="300"/>
+              </a:spcAft>
+              <a:defRPr/>
+            </a:pPr>
+            <a:endParaRPr lang="fr-FR" sz="1600" noProof="1">
+              <a:solidFill>
+                <a:schemeClr val="tx1"/>
+              </a:solidFill>
+            </a:endParaRPr>
+          </a:p>
+          <a:p>
+            <a:pPr>
+              <a:spcBef>
+                <a:spcPts val="300"/>
+              </a:spcBef>
+              <a:spcAft>
+                <a:spcPts val="300"/>
+              </a:spcAft>
+              <a:defRPr/>
+            </a:pPr>
+            <a:endParaRPr lang="fr-FR" sz="1600" b="1" noProof="1">
+              <a:solidFill>
+                <a:schemeClr val="tx1"/>
+              </a:solidFill>
+            </a:endParaRPr>
+          </a:p>
+          <a:p>
+            <a:pPr>
+              <a:spcBef>
+                <a:spcPts val="300"/>
+              </a:spcBef>
+              <a:spcAft>
+                <a:spcPts val="300"/>
+              </a:spcAft>
+              <a:defRPr/>
+            </a:pPr>
+            <a:endParaRPr lang="fr-FR" sz="1600" b="1" noProof="1">
+              <a:solidFill>
+                <a:schemeClr val="tx1"/>
+              </a:solidFill>
+            </a:endParaRPr>
+          </a:p>
+          <a:p>
+            <a:pPr>
+              <a:spcBef>
+                <a:spcPts val="300"/>
+              </a:spcBef>
+              <a:spcAft>
+                <a:spcPts val="300"/>
+              </a:spcAft>
+              <a:defRPr/>
+            </a:pPr>
+            <a:endParaRPr lang="fr-FR" sz="1600" b="1" noProof="1">
+              <a:solidFill>
+                <a:schemeClr val="tx1"/>
+              </a:solidFill>
+            </a:endParaRPr>
+          </a:p>
+          <a:p>
+            <a:pPr>
+              <a:spcBef>
+                <a:spcPts val="300"/>
+              </a:spcBef>
+              <a:spcAft>
+                <a:spcPts val="300"/>
+              </a:spcAft>
+              <a:defRPr/>
+            </a:pPr>
+            <a:endParaRPr lang="fr-FR" sz="1600" b="1" noProof="1">
+              <a:solidFill>
+                <a:schemeClr val="tx1"/>
+              </a:solidFill>
+            </a:endParaRPr>
+          </a:p>
+          <a:p>
+            <a:pPr>
+              <a:spcBef>
+                <a:spcPts val="300"/>
+              </a:spcBef>
+              <a:spcAft>
+                <a:spcPts val="300"/>
+              </a:spcAft>
+              <a:defRPr/>
+            </a:pPr>
+            <a:endParaRPr lang="fr-FR" sz="1600" b="1" noProof="1">
+              <a:solidFill>
+                <a:schemeClr val="tx1"/>
+              </a:solidFill>
+            </a:endParaRPr>
+          </a:p>
+          <a:p>
+            <a:pPr>
+              <a:spcBef>
+                <a:spcPts val="300"/>
+              </a:spcBef>
+              <a:spcAft>
+                <a:spcPts val="300"/>
+              </a:spcAft>
+              <a:defRPr/>
+            </a:pPr>
+            <a:endParaRPr lang="fr-FR" sz="1600" b="1" noProof="1">
+              <a:solidFill>
+                <a:schemeClr val="tx1"/>
+              </a:solidFill>
+            </a:endParaRPr>
+          </a:p>
+          <a:p>
+            <a:pPr>
+              <a:spcBef>
+                <a:spcPts val="300"/>
+              </a:spcBef>
+              <a:spcAft>
+                <a:spcPts val="300"/>
+              </a:spcAft>
+              <a:defRPr/>
+            </a:pPr>
+            <a:endParaRPr lang="fr-FR" sz="1600" noProof="1">
+              <a:solidFill>
+                <a:schemeClr val="tx1"/>
+              </a:solidFill>
+            </a:endParaRPr>
+          </a:p>
+          <a:p>
+            <a:pPr>
+              <a:spcBef>
+                <a:spcPts val="300"/>
+              </a:spcBef>
+              <a:spcAft>
+                <a:spcPts val="300"/>
+              </a:spcAft>
+              <a:defRPr/>
+            </a:pPr>
+            <a:endParaRPr lang="fr-FR" sz="100" noProof="1">
+              <a:solidFill>
+                <a:schemeClr val="tx1"/>
+              </a:solidFill>
+            </a:endParaRPr>
+          </a:p>
+        </p:txBody>
+      </p:sp>
+      <p:sp>
+        <p:nvSpPr>
+          <p:cNvPr id="10" name="Text Box 10">
+            <a:extLst>
+              <a:ext uri="{FF2B5EF4-FFF2-40B4-BE49-F238E27FC236}">
+                <a16:creationId xmlns:a16="http://schemas.microsoft.com/office/drawing/2014/main" id="{759A0114-09E8-A308-2B7A-8056F4AF4617}"/>
+              </a:ext>
+            </a:extLst>
+          </p:cNvPr>
+          <p:cNvSpPr txBox="1">
+            <a:spLocks noChangeArrowheads="1"/>
+          </p:cNvSpPr>
+          <p:nvPr/>
+        </p:nvSpPr>
+        <p:spPr bwMode="auto">
+          <a:xfrm>
+            <a:off x="6112223" y="5576882"/>
+            <a:ext cx="3960000" cy="4788000"/>
+          </a:xfrm>
+          <a:prstGeom prst="rect">
+            <a:avLst/>
+          </a:prstGeom>
+          <a:ln>
+            <a:headEnd/>
+            <a:tailEnd/>
+          </a:ln>
+        </p:spPr>
+        <p:style>
+          <a:lnRef idx="0">
+            <a:schemeClr val="accent3"/>
+          </a:lnRef>
+          <a:fillRef idx="3">
+            <a:schemeClr val="accent3"/>
+          </a:fillRef>
+          <a:effectRef idx="3">
+            <a:schemeClr val="accent3"/>
+          </a:effectRef>
+          <a:fontRef idx="minor">
+            <a:schemeClr val="lt1"/>
+          </a:fontRef>
+        </p:style>
+        <p:txBody>
+          <a:bodyPr wrap="square">
+            <a:spAutoFit/>
+          </a:bodyPr>
+          <a:lstStyle/>
+          <a:p>
+            <a:pPr>
+              <a:spcBef>
+                <a:spcPts val="300"/>
+              </a:spcBef>
+              <a:spcAft>
+                <a:spcPts val="300"/>
+              </a:spcAft>
+              <a:defRPr/>
+            </a:pPr>
+            <a:r>
+              <a:rPr lang="fr-FR" sz="1600" b="1" noProof="1">
+                <a:solidFill>
+                  <a:schemeClr val="tx1"/>
+                </a:solidFill>
+              </a:rPr>
+              <a:t>Entry: ChargeItem </a:t>
+            </a:r>
+            <a:r>
+              <a:rPr lang="fr-FR" sz="1600" noProof="1">
+                <a:solidFill>
+                  <a:schemeClr val="tx1"/>
+                </a:solidFill>
+              </a:rPr>
+              <a:t>(1..*)</a:t>
+            </a:r>
+          </a:p>
+          <a:p>
+            <a:pPr>
+              <a:spcBef>
+                <a:spcPts val="300"/>
+              </a:spcBef>
+              <a:spcAft>
+                <a:spcPts val="300"/>
+              </a:spcAft>
+              <a:defRPr/>
+            </a:pPr>
+            <a:endParaRPr lang="fr-FR" sz="1600" noProof="1">
+              <a:solidFill>
+                <a:schemeClr val="tx1"/>
+              </a:solidFill>
+            </a:endParaRPr>
+          </a:p>
+          <a:p>
+            <a:pPr>
+              <a:spcBef>
+                <a:spcPts val="300"/>
+              </a:spcBef>
+              <a:spcAft>
+                <a:spcPts val="300"/>
+              </a:spcAft>
+              <a:defRPr/>
+            </a:pPr>
+            <a:endParaRPr lang="fr-FR" sz="1600" noProof="1">
+              <a:solidFill>
+                <a:schemeClr val="tx1"/>
+              </a:solidFill>
+            </a:endParaRPr>
+          </a:p>
+          <a:p>
+            <a:pPr>
+              <a:spcBef>
+                <a:spcPts val="300"/>
+              </a:spcBef>
+              <a:spcAft>
+                <a:spcPts val="300"/>
+              </a:spcAft>
+              <a:defRPr/>
+            </a:pPr>
+            <a:endParaRPr lang="fr-FR" sz="1600" noProof="1">
+              <a:solidFill>
+                <a:schemeClr val="tx1"/>
+              </a:solidFill>
+            </a:endParaRPr>
+          </a:p>
+          <a:p>
+            <a:pPr>
+              <a:spcBef>
+                <a:spcPts val="300"/>
+              </a:spcBef>
+              <a:spcAft>
+                <a:spcPts val="300"/>
+              </a:spcAft>
+              <a:defRPr/>
+            </a:pPr>
+            <a:endParaRPr lang="fr-FR" sz="1600" noProof="1">
+              <a:solidFill>
+                <a:schemeClr val="tx1"/>
+              </a:solidFill>
+            </a:endParaRPr>
+          </a:p>
+          <a:p>
+            <a:pPr>
+              <a:spcBef>
+                <a:spcPts val="300"/>
+              </a:spcBef>
+              <a:spcAft>
+                <a:spcPts val="300"/>
+              </a:spcAft>
+              <a:defRPr/>
+            </a:pPr>
+            <a:endParaRPr lang="fr-FR" sz="1600" noProof="1">
+              <a:solidFill>
+                <a:schemeClr val="tx1"/>
+              </a:solidFill>
+            </a:endParaRPr>
+          </a:p>
+          <a:p>
+            <a:pPr>
+              <a:spcBef>
+                <a:spcPts val="300"/>
+              </a:spcBef>
+              <a:spcAft>
+                <a:spcPts val="300"/>
+              </a:spcAft>
+              <a:defRPr/>
+            </a:pPr>
+            <a:endParaRPr lang="fr-FR" sz="1600" noProof="1">
+              <a:solidFill>
+                <a:schemeClr val="tx1"/>
+              </a:solidFill>
+            </a:endParaRPr>
+          </a:p>
+          <a:p>
+            <a:pPr>
+              <a:spcBef>
+                <a:spcPts val="300"/>
+              </a:spcBef>
+              <a:spcAft>
+                <a:spcPts val="300"/>
+              </a:spcAft>
+              <a:defRPr/>
+            </a:pPr>
+            <a:endParaRPr lang="fr-FR" sz="1600" noProof="1">
+              <a:solidFill>
+                <a:schemeClr val="tx1"/>
+              </a:solidFill>
+            </a:endParaRPr>
+          </a:p>
+          <a:p>
+            <a:pPr>
+              <a:spcBef>
+                <a:spcPts val="300"/>
+              </a:spcBef>
+              <a:spcAft>
+                <a:spcPts val="300"/>
+              </a:spcAft>
+              <a:defRPr/>
+            </a:pPr>
+            <a:endParaRPr lang="fr-FR" sz="1600" noProof="1">
+              <a:solidFill>
+                <a:schemeClr val="tx1"/>
+              </a:solidFill>
+            </a:endParaRPr>
+          </a:p>
+          <a:p>
+            <a:pPr>
+              <a:spcBef>
+                <a:spcPts val="300"/>
+              </a:spcBef>
+              <a:spcAft>
+                <a:spcPts val="300"/>
+              </a:spcAft>
+              <a:defRPr/>
+            </a:pPr>
+            <a:endParaRPr lang="fr-FR" sz="1600" noProof="1">
+              <a:solidFill>
+                <a:schemeClr val="tx1"/>
+              </a:solidFill>
+            </a:endParaRPr>
+          </a:p>
+          <a:p>
+            <a:pPr>
+              <a:spcBef>
+                <a:spcPts val="300"/>
+              </a:spcBef>
+              <a:spcAft>
+                <a:spcPts val="300"/>
+              </a:spcAft>
+              <a:defRPr/>
+            </a:pPr>
+            <a:endParaRPr lang="fr-FR" sz="1600" noProof="1">
+              <a:solidFill>
+                <a:schemeClr val="tx1"/>
+              </a:solidFill>
+            </a:endParaRPr>
+          </a:p>
+          <a:p>
+            <a:pPr>
+              <a:spcBef>
+                <a:spcPts val="300"/>
+              </a:spcBef>
+              <a:spcAft>
+                <a:spcPts val="300"/>
+              </a:spcAft>
+              <a:defRPr/>
+            </a:pPr>
+            <a:endParaRPr lang="fr-FR" sz="300" noProof="1">
+              <a:solidFill>
+                <a:schemeClr val="tx1"/>
+              </a:solidFill>
+            </a:endParaRPr>
+          </a:p>
+        </p:txBody>
+      </p:sp>
+      <p:sp>
+        <p:nvSpPr>
+          <p:cNvPr id="12" name="Text Box 10">
+            <a:extLst>
+              <a:ext uri="{FF2B5EF4-FFF2-40B4-BE49-F238E27FC236}">
+                <a16:creationId xmlns:a16="http://schemas.microsoft.com/office/drawing/2014/main" id="{96CB95AC-7238-76B8-45E9-98939F60F56F}"/>
+              </a:ext>
+            </a:extLst>
+          </p:cNvPr>
+          <p:cNvSpPr txBox="1">
+            <a:spLocks noChangeArrowheads="1"/>
+          </p:cNvSpPr>
+          <p:nvPr/>
+        </p:nvSpPr>
+        <p:spPr bwMode="auto">
+          <a:xfrm>
+            <a:off x="6251522" y="5973475"/>
+            <a:ext cx="3623024" cy="430887"/>
+          </a:xfrm>
+          <a:prstGeom prst="rect">
+            <a:avLst/>
+          </a:prstGeom>
+          <a:ln>
+            <a:headEnd/>
+            <a:tailEnd/>
+          </a:ln>
+        </p:spPr>
+        <p:style>
+          <a:lnRef idx="0">
+            <a:schemeClr val="accent3"/>
+          </a:lnRef>
+          <a:fillRef idx="3">
+            <a:schemeClr val="accent3"/>
+          </a:fillRef>
+          <a:effectRef idx="3">
+            <a:schemeClr val="accent3"/>
+          </a:effectRef>
+          <a:fontRef idx="minor">
+            <a:schemeClr val="lt1"/>
+          </a:fontRef>
+        </p:style>
+        <p:txBody>
+          <a:bodyPr wrap="square">
+            <a:spAutoFit/>
+          </a:bodyPr>
+          <a:lstStyle/>
+          <a:p>
+            <a:pPr>
+              <a:spcBef>
+                <a:spcPts val="300"/>
+              </a:spcBef>
+              <a:spcAft>
+                <a:spcPts val="300"/>
+              </a:spcAft>
+              <a:defRPr/>
+            </a:pPr>
+            <a:r>
+              <a:rPr lang="fr-FR" sz="1600" noProof="1">
+                <a:solidFill>
+                  <a:schemeClr val="tx1"/>
+                </a:solidFill>
+              </a:rPr>
+              <a:t>Patient (contained)</a:t>
+            </a:r>
+          </a:p>
+          <a:p>
+            <a:pPr>
+              <a:spcBef>
+                <a:spcPts val="300"/>
+              </a:spcBef>
+              <a:spcAft>
+                <a:spcPts val="300"/>
+              </a:spcAft>
+              <a:defRPr/>
+            </a:pPr>
+            <a:endParaRPr lang="fr-FR" sz="100" noProof="1">
+              <a:solidFill>
+                <a:schemeClr val="tx1"/>
+              </a:solidFill>
+            </a:endParaRPr>
+          </a:p>
+        </p:txBody>
+      </p:sp>
+      <p:sp>
+        <p:nvSpPr>
+          <p:cNvPr id="13" name="Text Box 10">
+            <a:extLst>
+              <a:ext uri="{FF2B5EF4-FFF2-40B4-BE49-F238E27FC236}">
+                <a16:creationId xmlns:a16="http://schemas.microsoft.com/office/drawing/2014/main" id="{3519E5AE-2259-FA8D-1EB4-D06DA1F9CBD2}"/>
+              </a:ext>
+            </a:extLst>
+          </p:cNvPr>
+          <p:cNvSpPr txBox="1">
+            <a:spLocks noChangeArrowheads="1"/>
+          </p:cNvSpPr>
+          <p:nvPr/>
+        </p:nvSpPr>
+        <p:spPr bwMode="auto">
+          <a:xfrm>
+            <a:off x="6251522" y="6468190"/>
+            <a:ext cx="3623024" cy="1077218"/>
+          </a:xfrm>
+          <a:prstGeom prst="rect">
+            <a:avLst/>
+          </a:prstGeom>
+          <a:ln>
+            <a:headEnd/>
+            <a:tailEnd/>
+          </a:ln>
+        </p:spPr>
+        <p:style>
+          <a:lnRef idx="0">
+            <a:schemeClr val="accent1"/>
+          </a:lnRef>
+          <a:fillRef idx="3">
+            <a:schemeClr val="accent1"/>
+          </a:fillRef>
+          <a:effectRef idx="3">
+            <a:schemeClr val="accent1"/>
+          </a:effectRef>
+          <a:fontRef idx="minor">
+            <a:schemeClr val="lt1"/>
+          </a:fontRef>
+        </p:style>
+        <p:txBody>
+          <a:bodyPr wrap="square">
+            <a:spAutoFit/>
+          </a:bodyPr>
+          <a:lstStyle/>
+          <a:p>
+            <a:pPr>
+              <a:spcBef>
+                <a:spcPts val="300"/>
+              </a:spcBef>
+              <a:spcAft>
+                <a:spcPts val="300"/>
+              </a:spcAft>
+              <a:defRPr/>
+            </a:pPr>
+            <a:r>
+              <a:rPr lang="fr-FR" sz="1600" noProof="1">
+                <a:solidFill>
+                  <a:schemeClr val="tx1"/>
+                </a:solidFill>
+              </a:rPr>
+              <a:t>Encounter (contained)</a:t>
+            </a:r>
+          </a:p>
+          <a:p>
+            <a:pPr>
+              <a:spcBef>
+                <a:spcPts val="300"/>
+              </a:spcBef>
+              <a:spcAft>
+                <a:spcPts val="300"/>
+              </a:spcAft>
+              <a:defRPr/>
+            </a:pPr>
+            <a:endParaRPr lang="fr-FR" sz="1600" noProof="1">
+              <a:solidFill>
+                <a:schemeClr val="tx1"/>
+              </a:solidFill>
+            </a:endParaRPr>
+          </a:p>
+          <a:p>
+            <a:pPr>
+              <a:spcBef>
+                <a:spcPts val="300"/>
+              </a:spcBef>
+              <a:spcAft>
+                <a:spcPts val="300"/>
+              </a:spcAft>
+              <a:defRPr/>
+            </a:pPr>
+            <a:endParaRPr lang="fr-FR" sz="1600" noProof="1">
+              <a:solidFill>
+                <a:schemeClr val="tx1"/>
+              </a:solidFill>
+            </a:endParaRPr>
+          </a:p>
+          <a:p>
+            <a:pPr>
+              <a:spcBef>
+                <a:spcPts val="300"/>
+              </a:spcBef>
+              <a:spcAft>
+                <a:spcPts val="300"/>
+              </a:spcAft>
+              <a:defRPr/>
+            </a:pPr>
+            <a:endParaRPr lang="fr-FR" sz="100" noProof="1">
+              <a:solidFill>
+                <a:schemeClr val="tx1"/>
+              </a:solidFill>
+            </a:endParaRPr>
+          </a:p>
+        </p:txBody>
+      </p:sp>
+      <p:sp>
+        <p:nvSpPr>
+          <p:cNvPr id="14" name="Text Box 10">
+            <a:extLst>
+              <a:ext uri="{FF2B5EF4-FFF2-40B4-BE49-F238E27FC236}">
+                <a16:creationId xmlns:a16="http://schemas.microsoft.com/office/drawing/2014/main" id="{94F7ED2D-5F4B-A068-E088-9DA56F316C8E}"/>
+              </a:ext>
+            </a:extLst>
+          </p:cNvPr>
+          <p:cNvSpPr txBox="1">
+            <a:spLocks noChangeArrowheads="1"/>
+          </p:cNvSpPr>
+          <p:nvPr/>
+        </p:nvSpPr>
+        <p:spPr bwMode="auto">
+          <a:xfrm>
+            <a:off x="6251522" y="7606244"/>
+            <a:ext cx="3623024" cy="800219"/>
+          </a:xfrm>
+          <a:prstGeom prst="rect">
+            <a:avLst/>
+          </a:prstGeom>
+          <a:ln>
+            <a:headEnd/>
+            <a:tailEnd/>
+          </a:ln>
+        </p:spPr>
+        <p:style>
+          <a:lnRef idx="0">
+            <a:schemeClr val="accent2"/>
+          </a:lnRef>
+          <a:fillRef idx="3">
+            <a:schemeClr val="accent2"/>
+          </a:fillRef>
+          <a:effectRef idx="3">
+            <a:schemeClr val="accent2"/>
+          </a:effectRef>
+          <a:fontRef idx="minor">
+            <a:schemeClr val="lt1"/>
+          </a:fontRef>
+        </p:style>
+        <p:txBody>
+          <a:bodyPr wrap="square">
+            <a:spAutoFit/>
+          </a:bodyPr>
+          <a:lstStyle/>
+          <a:p>
+            <a:pPr>
+              <a:spcBef>
+                <a:spcPts val="300"/>
+              </a:spcBef>
+              <a:spcAft>
+                <a:spcPts val="300"/>
+              </a:spcAft>
+              <a:defRPr/>
+            </a:pPr>
+            <a:r>
+              <a:rPr lang="fr-FR" sz="1600" noProof="1">
+                <a:solidFill>
+                  <a:schemeClr val="tx1"/>
+                </a:solidFill>
+              </a:rPr>
+              <a:t>Condition (contained)</a:t>
+            </a:r>
+          </a:p>
+          <a:p>
+            <a:pPr>
+              <a:spcBef>
+                <a:spcPts val="300"/>
+              </a:spcBef>
+              <a:spcAft>
+                <a:spcPts val="300"/>
+              </a:spcAft>
+              <a:defRPr/>
+            </a:pPr>
+            <a:endParaRPr lang="fr-FR" sz="1600" noProof="1">
+              <a:solidFill>
+                <a:schemeClr val="tx1"/>
+              </a:solidFill>
+            </a:endParaRPr>
+          </a:p>
+          <a:p>
+            <a:pPr>
+              <a:spcBef>
+                <a:spcPts val="300"/>
+              </a:spcBef>
+              <a:spcAft>
+                <a:spcPts val="300"/>
+              </a:spcAft>
+              <a:defRPr/>
+            </a:pPr>
+            <a:endParaRPr lang="fr-FR" sz="400" noProof="1">
+              <a:solidFill>
+                <a:schemeClr val="tx1"/>
+              </a:solidFill>
+            </a:endParaRPr>
+          </a:p>
+        </p:txBody>
+      </p:sp>
+      <p:sp>
+        <p:nvSpPr>
+          <p:cNvPr id="15" name="Textfeld 16">
+            <a:extLst>
+              <a:ext uri="{FF2B5EF4-FFF2-40B4-BE49-F238E27FC236}">
+                <a16:creationId xmlns:a16="http://schemas.microsoft.com/office/drawing/2014/main" id="{4ACCCE85-D033-6A19-C377-6944876B1238}"/>
+              </a:ext>
+            </a:extLst>
+          </p:cNvPr>
+          <p:cNvSpPr txBox="1"/>
+          <p:nvPr/>
+        </p:nvSpPr>
+        <p:spPr>
+          <a:xfrm>
+            <a:off x="6354196" y="8504467"/>
+            <a:ext cx="3046087" cy="1169551"/>
+          </a:xfrm>
+          <a:prstGeom prst="rect">
+            <a:avLst/>
+          </a:prstGeom>
+          <a:noFill/>
+        </p:spPr>
+        <p:txBody>
+          <a:bodyPr wrap="square" rtlCol="0">
+            <a:spAutoFit/>
+          </a:bodyPr>
+          <a:lstStyle/>
+          <a:p>
+            <a:pPr marL="285750" indent="-285750">
+              <a:buFont typeface="Arial"/>
+              <a:buChar char="•"/>
+              <a:defRPr/>
+            </a:pPr>
+            <a:r>
+              <a:rPr lang="de-DE" sz="1400" i="1" dirty="0">
+                <a:solidFill>
+                  <a:srgbClr val="000000"/>
+                </a:solidFill>
+                <a:latin typeface="Times New Roman" pitchFamily="-107" charset="0"/>
+              </a:rPr>
+              <a:t>subject (Reference Patient 1..1)</a:t>
+            </a:r>
+          </a:p>
+          <a:p>
+            <a:pPr marL="285750" indent="-285750">
+              <a:buFont typeface="Arial"/>
+              <a:buChar char="•"/>
+              <a:defRPr/>
+            </a:pPr>
+            <a:r>
+              <a:rPr lang="de-DE" sz="1400" i="1" dirty="0">
+                <a:solidFill>
+                  <a:srgbClr val="000000"/>
+                </a:solidFill>
+                <a:latin typeface="Times New Roman" pitchFamily="-107" charset="0"/>
+              </a:rPr>
+              <a:t>context (Reference Encounter 1..1)</a:t>
+            </a:r>
+          </a:p>
+          <a:p>
+            <a:pPr marL="285750" indent="-285750">
+              <a:buFont typeface="Arial"/>
+              <a:buChar char="•"/>
+              <a:defRPr/>
+            </a:pPr>
+            <a:r>
+              <a:rPr lang="de-DE" sz="1400" i="1" dirty="0">
+                <a:solidFill>
+                  <a:srgbClr val="000000"/>
+                </a:solidFill>
+                <a:latin typeface="Times New Roman" pitchFamily="-107" charset="0"/>
+              </a:rPr>
+              <a:t>New: TPValue</a:t>
+            </a:r>
+          </a:p>
+          <a:p>
+            <a:pPr marL="285750" indent="-285750">
+              <a:buFont typeface="Arial"/>
+              <a:buChar char="•"/>
+              <a:defRPr/>
+            </a:pPr>
+            <a:r>
+              <a:rPr lang="de-DE" sz="1400" i="1" dirty="0">
+                <a:solidFill>
+                  <a:srgbClr val="000000"/>
+                </a:solidFill>
+                <a:latin typeface="Times New Roman" pitchFamily="-107" charset="0"/>
+              </a:rPr>
+              <a:t>New: PatientContactID</a:t>
+            </a:r>
+          </a:p>
+          <a:p>
+            <a:pPr>
+              <a:defRPr/>
+            </a:pPr>
+            <a:endParaRPr lang="de-DE" sz="1400" i="1" dirty="0">
+              <a:solidFill>
+                <a:srgbClr val="000000"/>
+              </a:solidFill>
+              <a:latin typeface="Times New Roman" pitchFamily="-107" charset="0"/>
+            </a:endParaRPr>
+          </a:p>
+        </p:txBody>
+      </p:sp>
+      <p:sp>
+        <p:nvSpPr>
+          <p:cNvPr id="16" name="Textfeld 16">
+            <a:extLst>
+              <a:ext uri="{FF2B5EF4-FFF2-40B4-BE49-F238E27FC236}">
+                <a16:creationId xmlns:a16="http://schemas.microsoft.com/office/drawing/2014/main" id="{E60CA670-3CB5-2774-84DF-89F5FCDE163C}"/>
+              </a:ext>
+            </a:extLst>
+          </p:cNvPr>
+          <p:cNvSpPr txBox="1"/>
+          <p:nvPr/>
+        </p:nvSpPr>
+        <p:spPr>
+          <a:xfrm>
+            <a:off x="6026642" y="3422184"/>
+            <a:ext cx="4526138" cy="523220"/>
+          </a:xfrm>
+          <a:prstGeom prst="rect">
+            <a:avLst/>
+          </a:prstGeom>
+          <a:noFill/>
+        </p:spPr>
+        <p:txBody>
+          <a:bodyPr wrap="square" rtlCol="0">
+            <a:spAutoFit/>
+          </a:bodyPr>
+          <a:lstStyle/>
+          <a:p>
+            <a:pPr marL="285750" indent="-285750">
+              <a:buFont typeface="Arial"/>
+              <a:buChar char="•"/>
+              <a:defRPr/>
+            </a:pPr>
+            <a:r>
+              <a:rPr lang="de-DE" sz="1400" i="1" dirty="0">
+                <a:solidFill>
+                  <a:srgbClr val="000000"/>
+                </a:solidFill>
+                <a:latin typeface="Times New Roman" pitchFamily="-107" charset="0"/>
+              </a:rPr>
+              <a:t>Parameters like </a:t>
+            </a:r>
+            <a:r>
+              <a:rPr lang="en-US" sz="1400" i="1" dirty="0">
+                <a:solidFill>
+                  <a:srgbClr val="000000"/>
+                </a:solidFill>
+                <a:latin typeface="Times New Roman" pitchFamily="-107" charset="0"/>
+              </a:rPr>
+              <a:t>timestamp</a:t>
+            </a:r>
+          </a:p>
+          <a:p>
+            <a:pPr marL="285750" indent="-285750">
+              <a:buFont typeface="Arial"/>
+              <a:buChar char="•"/>
+              <a:defRPr/>
+            </a:pPr>
+            <a:endParaRPr lang="de-DE" sz="1400" i="1" dirty="0">
+              <a:solidFill>
+                <a:srgbClr val="000000"/>
+              </a:solidFill>
+              <a:latin typeface="Times New Roman" pitchFamily="-107" charset="0"/>
+            </a:endParaRPr>
+          </a:p>
+        </p:txBody>
+      </p:sp>
+      <p:sp>
+        <p:nvSpPr>
+          <p:cNvPr id="17" name="Textfeld 16">
+            <a:extLst>
+              <a:ext uri="{FF2B5EF4-FFF2-40B4-BE49-F238E27FC236}">
+                <a16:creationId xmlns:a16="http://schemas.microsoft.com/office/drawing/2014/main" id="{9EAD8663-E53F-7D4B-9493-83FB29F913F2}"/>
+              </a:ext>
+            </a:extLst>
+          </p:cNvPr>
+          <p:cNvSpPr txBox="1"/>
+          <p:nvPr/>
+        </p:nvSpPr>
+        <p:spPr>
+          <a:xfrm>
+            <a:off x="6539992" y="6758766"/>
+            <a:ext cx="3240111" cy="523220"/>
+          </a:xfrm>
+          <a:prstGeom prst="rect">
+            <a:avLst/>
+          </a:prstGeom>
+          <a:noFill/>
+        </p:spPr>
+        <p:txBody>
+          <a:bodyPr wrap="square" rtlCol="0">
+            <a:spAutoFit/>
+          </a:bodyPr>
+          <a:lstStyle/>
+          <a:p>
+            <a:pPr marL="285750" indent="-285750">
+              <a:buFont typeface="Arial"/>
+              <a:buChar char="•"/>
+              <a:defRPr/>
+            </a:pPr>
+            <a:r>
+              <a:rPr lang="de-DE" sz="1400" i="1" dirty="0">
+                <a:solidFill>
+                  <a:srgbClr val="000000"/>
+                </a:solidFill>
+                <a:latin typeface="Times New Roman" pitchFamily="-107" charset="0"/>
+              </a:rPr>
+              <a:t>subject (Reference Patient 1..1)</a:t>
+            </a:r>
+          </a:p>
+          <a:p>
+            <a:pPr marL="285750" indent="-285750">
+              <a:buFont typeface="Arial"/>
+              <a:buChar char="•"/>
+              <a:defRPr/>
+            </a:pPr>
+            <a:r>
+              <a:rPr lang="de-DE" sz="1400" i="1" dirty="0">
+                <a:solidFill>
+                  <a:srgbClr val="000000"/>
+                </a:solidFill>
+                <a:latin typeface="Times New Roman" pitchFamily="-107" charset="0"/>
+              </a:rPr>
+              <a:t>diagnosis (Reference Condition 0..1)</a:t>
+            </a:r>
+          </a:p>
+        </p:txBody>
+      </p:sp>
+      <p:sp>
+        <p:nvSpPr>
+          <p:cNvPr id="18" name="Textfeld 16">
+            <a:extLst>
+              <a:ext uri="{FF2B5EF4-FFF2-40B4-BE49-F238E27FC236}">
+                <a16:creationId xmlns:a16="http://schemas.microsoft.com/office/drawing/2014/main" id="{29C15653-9E03-F1F9-2782-63F4F8B7BE70}"/>
+              </a:ext>
+            </a:extLst>
+          </p:cNvPr>
+          <p:cNvSpPr txBox="1"/>
+          <p:nvPr/>
+        </p:nvSpPr>
+        <p:spPr>
+          <a:xfrm>
+            <a:off x="6537753" y="7857343"/>
+            <a:ext cx="3240111" cy="523220"/>
+          </a:xfrm>
+          <a:prstGeom prst="rect">
+            <a:avLst/>
+          </a:prstGeom>
+          <a:noFill/>
+        </p:spPr>
+        <p:txBody>
+          <a:bodyPr wrap="square" rtlCol="0">
+            <a:spAutoFit/>
+          </a:bodyPr>
+          <a:lstStyle/>
+          <a:p>
+            <a:pPr marL="285750" indent="-285750">
+              <a:buFont typeface="Arial"/>
+              <a:buChar char="•"/>
+              <a:defRPr/>
+            </a:pPr>
+            <a:r>
+              <a:rPr lang="de-DE" sz="1400" i="1" dirty="0">
+                <a:solidFill>
+                  <a:srgbClr val="000000"/>
+                </a:solidFill>
+                <a:latin typeface="Times New Roman" pitchFamily="-107" charset="0"/>
+              </a:rPr>
+              <a:t>subject (Reference Patient 1..1)</a:t>
+            </a:r>
+          </a:p>
+          <a:p>
+            <a:pPr marL="285750" indent="-285750">
+              <a:buFont typeface="Arial"/>
+              <a:buChar char="•"/>
+              <a:defRPr/>
+            </a:pPr>
+            <a:r>
+              <a:rPr lang="de-DE" sz="1400" i="1" dirty="0">
+                <a:solidFill>
+                  <a:srgbClr val="000000"/>
+                </a:solidFill>
+                <a:latin typeface="Times New Roman" pitchFamily="-107" charset="0"/>
+              </a:rPr>
+              <a:t>OnsetDateTime, Laterality</a:t>
+            </a:r>
           </a:p>
         </p:txBody>
       </p:sp>

</xml_diff>